<commit_message>
update the yt link
</commit_message>
<xml_diff>
--- a/project_documents/P21_Poster.pptx
+++ b/project_documents/P21_Poster.pptx
@@ -504,7 +504,7 @@
               <a:pPr>
                 <a:defRPr/>
               </a:pPr>
-              <a:t>2023/2/5</a:t>
+              <a:t>2023/2/6</a:t>
             </a:fld>
             <a:endParaRPr lang="zh-CN" altLang="en-US"/>
           </a:p>
@@ -2808,8 +2808,8 @@
         </p:blipFill>
         <p:spPr>
           <a:xfrm>
-            <a:off x="61383" y="6381750"/>
-            <a:ext cx="30238701" cy="36106100"/>
+            <a:off x="0" y="6267450"/>
+            <a:ext cx="30238701" cy="36471225"/>
           </a:xfrm>
           <a:prstGeom prst="rect">
             <a:avLst/>
@@ -4182,66 +4182,6 @@
               <a:defRPr/>
             </a:pPr>
             <a:endParaRPr lang="en-US"/>
-          </a:p>
-        </p:txBody>
-      </p:sp>
-      <p:sp>
-        <p:nvSpPr>
-          <p:cNvPr id="35" name="Rectangle 34">
-            <a:extLst>
-              <a:ext uri="{FF2B5EF4-FFF2-40B4-BE49-F238E27FC236}">
-                <a16:creationId xmlns:a16="http://schemas.microsoft.com/office/drawing/2014/main" id="{88815B7A-5558-AEEE-967F-80AD051FF87D}"/>
-              </a:ext>
-            </a:extLst>
-          </p:cNvPr>
-          <p:cNvSpPr/>
-          <p:nvPr/>
-        </p:nvSpPr>
-        <p:spPr>
-          <a:xfrm>
-            <a:off x="22674263" y="21147549"/>
-            <a:ext cx="5873750" cy="5076825"/>
-          </a:xfrm>
-          <a:prstGeom prst="rect">
-            <a:avLst/>
-          </a:prstGeom>
-          <a:ln>
-            <a:solidFill>
-              <a:schemeClr val="bg1"/>
-            </a:solidFill>
-          </a:ln>
-        </p:spPr>
-        <p:style>
-          <a:lnRef idx="2">
-            <a:schemeClr val="dk1"/>
-          </a:lnRef>
-          <a:fillRef idx="1">
-            <a:schemeClr val="lt1"/>
-          </a:fillRef>
-          <a:effectRef idx="0">
-            <a:schemeClr val="dk1"/>
-          </a:effectRef>
-          <a:fontRef idx="minor">
-            <a:schemeClr val="dk1"/>
-          </a:fontRef>
-        </p:style>
-        <p:txBody>
-          <a:bodyPr anchor="ctr"/>
-          <a:lstStyle/>
-          <a:p>
-            <a:pPr algn="ctr">
-              <a:defRPr/>
-            </a:pPr>
-            <a:r>
-              <a:rPr lang="en-US" sz="6300" dirty="0">
-                <a:solidFill>
-                  <a:srgbClr val="314375"/>
-                </a:solidFill>
-                <a:latin typeface="Arial" panose="020B0604020202020204" pitchFamily="34" charset="0"/>
-                <a:cs typeface="Arial" panose="020B0604020202020204" pitchFamily="34" charset="0"/>
-              </a:rPr>
-              <a:t>QR Code for Video Demo</a:t>
-            </a:r>
           </a:p>
         </p:txBody>
       </p:sp>
@@ -6679,27 +6619,7 @@
                 <a:latin typeface="Times New Roman" panose="02020603050405020304" pitchFamily="18" charset="0"/>
                 <a:cs typeface="Times New Roman" panose="02020603050405020304" pitchFamily="18" charset="0"/>
               </a:rPr>
-              <a:t>Customize</a:t>
-            </a:r>
-            <a:r>
-              <a:rPr lang="en-US" altLang="zh-CN" sz="5700" dirty="0">
-                <a:solidFill>
-                  <a:srgbClr val="2C3F71"/>
-                </a:solidFill>
-                <a:latin typeface="Times New Roman" panose="02020603050405020304" pitchFamily="18" charset="0"/>
-                <a:cs typeface="Times New Roman" panose="02020603050405020304" pitchFamily="18" charset="0"/>
-              </a:rPr>
-              <a:t> with users’ </a:t>
-            </a:r>
-            <a:r>
-              <a:rPr lang="en-US" altLang="zh-CN" sz="5700" b="1" dirty="0">
-                <a:solidFill>
-                  <a:srgbClr val="2C3F71"/>
-                </a:solidFill>
-                <a:latin typeface="Times New Roman" panose="02020603050405020304" pitchFamily="18" charset="0"/>
-                <a:cs typeface="Times New Roman" panose="02020603050405020304" pitchFamily="18" charset="0"/>
-              </a:rPr>
-              <a:t>habits</a:t>
+              <a:t>Fit within your preferences </a:t>
             </a:r>
             <a:endParaRPr lang="zh-CN" altLang="en-US" sz="5700" b="1" dirty="0">
               <a:solidFill>
@@ -7842,7 +7762,7 @@
                 <a:latin typeface="Times New Roman" panose="02020603050405020304" pitchFamily="18" charset="0"/>
                 <a:cs typeface="Times New Roman" panose="02020603050405020304" pitchFamily="18" charset="0"/>
               </a:rPr>
-              <a:t>Fulfil your needs</a:t>
+              <a:t>Cater your needs</a:t>
             </a:r>
             <a:endParaRPr lang="zh-CN" altLang="en-US" sz="5700" dirty="0">
               <a:solidFill>
@@ -8347,7 +8267,7 @@
                 <a:latin typeface="Times New Roman" panose="02020603050405020304" pitchFamily="18" charset="0"/>
                 <a:cs typeface="Times New Roman" panose="02020603050405020304" pitchFamily="18" charset="0"/>
               </a:rPr>
-              <a:t>Selling IR camera</a:t>
+              <a:t>Selling IR camera with system</a:t>
             </a:r>
             <a:endParaRPr lang="en-US" altLang="zh-CN" sz="4800" b="1" dirty="0">
               <a:solidFill>
@@ -8568,6 +8488,78 @@
               </a14:hiddenFill>
             </a:ext>
           </a:extLst>
+        </p:spPr>
+      </p:pic>
+      <p:pic>
+        <p:nvPicPr>
+          <p:cNvPr id="11" name="图片 10" descr="卡通人物&#10;&#10;描述已自动生成">
+            <a:extLst>
+              <a:ext uri="{FF2B5EF4-FFF2-40B4-BE49-F238E27FC236}">
+                <a16:creationId xmlns:a16="http://schemas.microsoft.com/office/drawing/2014/main" id="{195EE9ED-21A6-20DD-FF3B-D2B9D62C895B}"/>
+              </a:ext>
+            </a:extLst>
+          </p:cNvPr>
+          <p:cNvPicPr>
+            <a:picLocks noChangeAspect="1"/>
+          </p:cNvPicPr>
+          <p:nvPr/>
+        </p:nvPicPr>
+        <p:blipFill>
+          <a:blip r:embed="rId20">
+            <a:extLst>
+              <a:ext uri="{28A0092B-C50C-407E-A947-70E740481C1C}">
+                <a14:useLocalDpi xmlns:a14="http://schemas.microsoft.com/office/drawing/2010/main" val="0"/>
+              </a:ext>
+            </a:extLst>
+          </a:blip>
+          <a:stretch>
+            <a:fillRect/>
+          </a:stretch>
+        </p:blipFill>
+        <p:spPr>
+          <a:xfrm>
+            <a:off x="25250071" y="16713412"/>
+            <a:ext cx="4277430" cy="2414933"/>
+          </a:xfrm>
+          <a:prstGeom prst="rect">
+            <a:avLst/>
+          </a:prstGeom>
+        </p:spPr>
+      </p:pic>
+      <p:pic>
+        <p:nvPicPr>
+          <p:cNvPr id="10" name="图片 9" descr="QR 代码&#10;&#10;描述已自动生成">
+            <a:extLst>
+              <a:ext uri="{FF2B5EF4-FFF2-40B4-BE49-F238E27FC236}">
+                <a16:creationId xmlns:a16="http://schemas.microsoft.com/office/drawing/2014/main" id="{1988E615-DC94-3FF8-FBF5-0E221BEBC14E}"/>
+              </a:ext>
+            </a:extLst>
+          </p:cNvPr>
+          <p:cNvPicPr>
+            <a:picLocks noChangeAspect="1"/>
+          </p:cNvPicPr>
+          <p:nvPr/>
+        </p:nvPicPr>
+        <p:blipFill>
+          <a:blip r:embed="rId21">
+            <a:extLst>
+              <a:ext uri="{28A0092B-C50C-407E-A947-70E740481C1C}">
+                <a14:useLocalDpi xmlns:a14="http://schemas.microsoft.com/office/drawing/2010/main" val="0"/>
+              </a:ext>
+            </a:extLst>
+          </a:blip>
+          <a:stretch>
+            <a:fillRect/>
+          </a:stretch>
+        </p:blipFill>
+        <p:spPr>
+          <a:xfrm>
+            <a:off x="22951149" y="21002634"/>
+            <a:ext cx="5269177" cy="5269177"/>
+          </a:xfrm>
+          <a:prstGeom prst="rect">
+            <a:avLst/>
+          </a:prstGeom>
         </p:spPr>
       </p:pic>
     </p:spTree>
@@ -9435,12 +9427,21 @@
 </file>
 
 <file path=customXml/item1.xml><?xml version="1.0" encoding="utf-8"?>
+<?mso-contentType ?>
+<FormTemplates xmlns="http://schemas.microsoft.com/sharepoint/v3/contenttype/forms">
+  <Display>DocumentLibraryForm</Display>
+  <Edit>DocumentLibraryForm</Edit>
+  <New>DocumentLibraryForm</New>
+</FormTemplates>
+</file>
+
+<file path=customXml/item2.xml><?xml version="1.0" encoding="utf-8"?>
 <p:properties xmlns:p="http://schemas.microsoft.com/office/2006/metadata/properties" xmlns:xsi="http://www.w3.org/2001/XMLSchema-instance" xmlns:pc="http://schemas.microsoft.com/office/infopath/2007/PartnerControls">
   <documentManagement/>
 </p:properties>
 </file>
 
-<file path=customXml/item2.xml><?xml version="1.0" encoding="utf-8"?>
+<file path=customXml/item3.xml><?xml version="1.0" encoding="utf-8"?>
 <ct:contentTypeSchema xmlns:ct="http://schemas.microsoft.com/office/2006/metadata/contentType" xmlns:ma="http://schemas.microsoft.com/office/2006/metadata/properties/metaAttributes" ct:_="" ma:_="" ma:contentTypeName="Document" ma:contentTypeID="0x0101004F1654235C5CA44FBA336076A8AAA218" ma:contentTypeVersion="7" ma:contentTypeDescription="Create a new document." ma:contentTypeScope="" ma:versionID="09927aeacaff90a9d782380c295c03d2">
   <xsd:schema xmlns:xsd="http://www.w3.org/2001/XMLSchema" xmlns:xs="http://www.w3.org/2001/XMLSchema" xmlns:p="http://schemas.microsoft.com/office/2006/metadata/properties" xmlns:ns3="f792bfd4-8775-4c64-9cc0-5deceb05eff7" xmlns:ns4="5d311089-2fdb-4465-bd6c-265a8c34f07c" targetNamespace="http://schemas.microsoft.com/office/2006/metadata/properties" ma:root="true" ma:fieldsID="d4395c7fb537e951d187637c17016761" ns3:_="" ns4:_="">
     <xsd:import namespace="f792bfd4-8775-4c64-9cc0-5deceb05eff7"/>
@@ -9625,16 +9626,15 @@
 </ct:contentTypeSchema>
 </file>
 
-<file path=customXml/item3.xml><?xml version="1.0" encoding="utf-8"?>
-<?mso-contentType ?>
-<FormTemplates xmlns="http://schemas.microsoft.com/sharepoint/v3/contenttype/forms">
-  <Display>DocumentLibraryForm</Display>
-  <Edit>DocumentLibraryForm</Edit>
-  <New>DocumentLibraryForm</New>
-</FormTemplates>
+<file path=customXml/itemProps1.xml><?xml version="1.0" encoding="utf-8"?>
+<ds:datastoreItem xmlns:ds="http://schemas.openxmlformats.org/officeDocument/2006/customXml" ds:itemID="{531510A3-D1FE-45C8-AE9E-F9898CA69D81}">
+  <ds:schemaRefs>
+    <ds:schemaRef ds:uri="http://schemas.microsoft.com/sharepoint/v3/contenttype/forms"/>
+  </ds:schemaRefs>
+</ds:datastoreItem>
 </file>
 
-<file path=customXml/itemProps1.xml><?xml version="1.0" encoding="utf-8"?>
+<file path=customXml/itemProps2.xml><?xml version="1.0" encoding="utf-8"?>
 <ds:datastoreItem xmlns:ds="http://schemas.openxmlformats.org/officeDocument/2006/customXml" ds:itemID="{A5229628-06EB-46DA-98C9-4D149DC96CAC}">
   <ds:schemaRefs>
     <ds:schemaRef ds:uri="http://www.w3.org/XML/1998/namespace"/>
@@ -9651,7 +9651,7 @@
 </ds:datastoreItem>
 </file>
 
-<file path=customXml/itemProps2.xml><?xml version="1.0" encoding="utf-8"?>
+<file path=customXml/itemProps3.xml><?xml version="1.0" encoding="utf-8"?>
 <ds:datastoreItem xmlns:ds="http://schemas.openxmlformats.org/officeDocument/2006/customXml" ds:itemID="{73ED156F-4D9B-4BCA-B04D-4E9F74EB47FC}">
   <ds:schemaRefs>
     <ds:schemaRef ds:uri="http://schemas.microsoft.com/office/2006/metadata/contentType"/>
@@ -9668,12 +9668,4 @@
     <ds:schemaRef ds:uri="http://schemas.microsoft.com/internal/obd"/>
   </ds:schemaRefs>
 </ds:datastoreItem>
-</file>
-
-<file path=customXml/itemProps3.xml><?xml version="1.0" encoding="utf-8"?>
-<ds:datastoreItem xmlns:ds="http://schemas.openxmlformats.org/officeDocument/2006/customXml" ds:itemID="{531510A3-D1FE-45C8-AE9E-F9898CA69D81}">
-  <ds:schemaRefs>
-    <ds:schemaRef ds:uri="http://schemas.microsoft.com/sharepoint/v3/contenttype/forms"/>
-  </ds:schemaRefs>
-</ds:datastoreItem>
 </file>
</xml_diff>